<commit_message>
Cash Book - FE
</commit_message>
<xml_diff>
--- a/Design.pptx
+++ b/Design.pptx
@@ -2061,7 +2061,7 @@
           <a:p>
             <a:fld id="{8584B886-2642-4FA4-9BEF-D5EB2CF943E7}" type="datetimeFigureOut">
               <a:rPr lang="en-US" smtClean="0"/>
-              <a:t>1/25/2024</a:t>
+              <a:t>2/1/2024</a:t>
             </a:fld>
             <a:endParaRPr lang="en-US"/>
           </a:p>
@@ -2259,7 +2259,7 @@
           <a:p>
             <a:fld id="{8584B886-2642-4FA4-9BEF-D5EB2CF943E7}" type="datetimeFigureOut">
               <a:rPr lang="en-US" smtClean="0"/>
-              <a:t>1/25/2024</a:t>
+              <a:t>2/1/2024</a:t>
             </a:fld>
             <a:endParaRPr lang="en-US"/>
           </a:p>
@@ -2467,7 +2467,7 @@
           <a:p>
             <a:fld id="{8584B886-2642-4FA4-9BEF-D5EB2CF943E7}" type="datetimeFigureOut">
               <a:rPr lang="en-US" smtClean="0"/>
-              <a:t>1/25/2024</a:t>
+              <a:t>2/1/2024</a:t>
             </a:fld>
             <a:endParaRPr lang="en-US"/>
           </a:p>
@@ -2665,7 +2665,7 @@
           <a:p>
             <a:fld id="{8584B886-2642-4FA4-9BEF-D5EB2CF943E7}" type="datetimeFigureOut">
               <a:rPr lang="en-US" smtClean="0"/>
-              <a:t>1/25/2024</a:t>
+              <a:t>2/1/2024</a:t>
             </a:fld>
             <a:endParaRPr lang="en-US"/>
           </a:p>
@@ -2940,7 +2940,7 @@
           <a:p>
             <a:fld id="{8584B886-2642-4FA4-9BEF-D5EB2CF943E7}" type="datetimeFigureOut">
               <a:rPr lang="en-US" smtClean="0"/>
-              <a:t>1/25/2024</a:t>
+              <a:t>2/1/2024</a:t>
             </a:fld>
             <a:endParaRPr lang="en-US"/>
           </a:p>
@@ -3205,7 +3205,7 @@
           <a:p>
             <a:fld id="{8584B886-2642-4FA4-9BEF-D5EB2CF943E7}" type="datetimeFigureOut">
               <a:rPr lang="en-US" smtClean="0"/>
-              <a:t>1/25/2024</a:t>
+              <a:t>2/1/2024</a:t>
             </a:fld>
             <a:endParaRPr lang="en-US"/>
           </a:p>
@@ -3617,7 +3617,7 @@
           <a:p>
             <a:fld id="{8584B886-2642-4FA4-9BEF-D5EB2CF943E7}" type="datetimeFigureOut">
               <a:rPr lang="en-US" smtClean="0"/>
-              <a:t>1/25/2024</a:t>
+              <a:t>2/1/2024</a:t>
             </a:fld>
             <a:endParaRPr lang="en-US"/>
           </a:p>
@@ -3758,7 +3758,7 @@
           <a:p>
             <a:fld id="{8584B886-2642-4FA4-9BEF-D5EB2CF943E7}" type="datetimeFigureOut">
               <a:rPr lang="en-US" smtClean="0"/>
-              <a:t>1/25/2024</a:t>
+              <a:t>2/1/2024</a:t>
             </a:fld>
             <a:endParaRPr lang="en-US"/>
           </a:p>
@@ -3871,7 +3871,7 @@
           <a:p>
             <a:fld id="{8584B886-2642-4FA4-9BEF-D5EB2CF943E7}" type="datetimeFigureOut">
               <a:rPr lang="en-US" smtClean="0"/>
-              <a:t>1/25/2024</a:t>
+              <a:t>2/1/2024</a:t>
             </a:fld>
             <a:endParaRPr lang="en-US"/>
           </a:p>
@@ -4182,7 +4182,7 @@
           <a:p>
             <a:fld id="{8584B886-2642-4FA4-9BEF-D5EB2CF943E7}" type="datetimeFigureOut">
               <a:rPr lang="en-US" smtClean="0"/>
-              <a:t>1/25/2024</a:t>
+              <a:t>2/1/2024</a:t>
             </a:fld>
             <a:endParaRPr lang="en-US"/>
           </a:p>
@@ -4470,7 +4470,7 @@
           <a:p>
             <a:fld id="{8584B886-2642-4FA4-9BEF-D5EB2CF943E7}" type="datetimeFigureOut">
               <a:rPr lang="en-US" smtClean="0"/>
-              <a:t>1/25/2024</a:t>
+              <a:t>2/1/2024</a:t>
             </a:fld>
             <a:endParaRPr lang="en-US"/>
           </a:p>
@@ -4711,7 +4711,7 @@
           <a:p>
             <a:fld id="{8584B886-2642-4FA4-9BEF-D5EB2CF943E7}" type="datetimeFigureOut">
               <a:rPr lang="en-US" smtClean="0"/>
-              <a:t>1/25/2024</a:t>
+              <a:t>2/1/2024</a:t>
             </a:fld>
             <a:endParaRPr lang="en-US"/>
           </a:p>

</xml_diff>